<commit_message>
Better figures in implementation and PDP
</commit_message>
<xml_diff>
--- a/fig/classic_video.pptx
+++ b/fig/classic_video.pptx
@@ -3352,6 +3352,11 @@
               <a:lumOff val="60000"/>
             </a:schemeClr>
           </a:solidFill>
+          <a:ln>
+            <a:solidFill>
+              <a:schemeClr val="tx1"/>
+            </a:solidFill>
+          </a:ln>
         </p:spPr>
         <p:style>
           <a:lnRef idx="2">
@@ -3406,6 +3411,11 @@
               <a:lumOff val="60000"/>
             </a:schemeClr>
           </a:solidFill>
+          <a:ln>
+            <a:solidFill>
+              <a:schemeClr val="tx1"/>
+            </a:solidFill>
+          </a:ln>
         </p:spPr>
         <p:style>
           <a:lnRef idx="2">
@@ -3467,6 +3477,11 @@
               <a:lumOff val="60000"/>
             </a:schemeClr>
           </a:solidFill>
+          <a:ln>
+            <a:solidFill>
+              <a:schemeClr val="tx1"/>
+            </a:solidFill>
+          </a:ln>
         </p:spPr>
         <p:style>
           <a:lnRef idx="2">
@@ -3528,6 +3543,11 @@
               <a:lumOff val="60000"/>
             </a:schemeClr>
           </a:solidFill>
+          <a:ln>
+            <a:solidFill>
+              <a:schemeClr val="tx1"/>
+            </a:solidFill>
+          </a:ln>
         </p:spPr>
         <p:style>
           <a:lnRef idx="2">
@@ -3589,6 +3609,11 @@
               <a:lumOff val="60000"/>
             </a:schemeClr>
           </a:solidFill>
+          <a:ln>
+            <a:solidFill>
+              <a:schemeClr val="tx1"/>
+            </a:solidFill>
+          </a:ln>
         </p:spPr>
         <p:style>
           <a:lnRef idx="2">
@@ -3650,6 +3675,11 @@
               <a:lumOff val="60000"/>
             </a:schemeClr>
           </a:solidFill>
+          <a:ln>
+            <a:solidFill>
+              <a:schemeClr val="tx1"/>
+            </a:solidFill>
+          </a:ln>
         </p:spPr>
         <p:style>
           <a:lnRef idx="2">
@@ -3711,6 +3741,11 @@
               <a:lumOff val="60000"/>
             </a:schemeClr>
           </a:solidFill>
+          <a:ln>
+            <a:solidFill>
+              <a:schemeClr val="tx1"/>
+            </a:solidFill>
+          </a:ln>
         </p:spPr>
         <p:style>
           <a:lnRef idx="2">
@@ -3772,6 +3807,11 @@
               <a:lumOff val="60000"/>
             </a:schemeClr>
           </a:solidFill>
+          <a:ln>
+            <a:solidFill>
+              <a:schemeClr val="tx1"/>
+            </a:solidFill>
+          </a:ln>
         </p:spPr>
         <p:style>
           <a:lnRef idx="2">
@@ -3833,6 +3873,11 @@
               <a:lumOff val="60000"/>
             </a:schemeClr>
           </a:solidFill>
+          <a:ln>
+            <a:solidFill>
+              <a:schemeClr val="tx1"/>
+            </a:solidFill>
+          </a:ln>
         </p:spPr>
         <p:style>
           <a:lnRef idx="2">
@@ -3894,6 +3939,11 @@
               <a:lumOff val="60000"/>
             </a:schemeClr>
           </a:solidFill>
+          <a:ln>
+            <a:solidFill>
+              <a:schemeClr val="tx1"/>
+            </a:solidFill>
+          </a:ln>
         </p:spPr>
         <p:style>
           <a:lnRef idx="2">
@@ -3955,6 +4005,11 @@
               <a:lumOff val="60000"/>
             </a:schemeClr>
           </a:solidFill>
+          <a:ln>
+            <a:solidFill>
+              <a:schemeClr val="tx1"/>
+            </a:solidFill>
+          </a:ln>
         </p:spPr>
         <p:style>
           <a:lnRef idx="2">
@@ -4016,6 +4071,11 @@
               <a:lumOff val="60000"/>
             </a:schemeClr>
           </a:solidFill>
+          <a:ln>
+            <a:solidFill>
+              <a:schemeClr val="tx1"/>
+            </a:solidFill>
+          </a:ln>
         </p:spPr>
         <p:style>
           <a:lnRef idx="2">
@@ -4077,6 +4137,11 @@
               <a:lumOff val="60000"/>
             </a:schemeClr>
           </a:solidFill>
+          <a:ln>
+            <a:solidFill>
+              <a:schemeClr val="tx1"/>
+            </a:solidFill>
+          </a:ln>
         </p:spPr>
         <p:style>
           <a:lnRef idx="2">
@@ -4138,6 +4203,11 @@
               <a:lumOff val="60000"/>
             </a:schemeClr>
           </a:solidFill>
+          <a:ln>
+            <a:solidFill>
+              <a:schemeClr val="tx1"/>
+            </a:solidFill>
+          </a:ln>
         </p:spPr>
         <p:style>
           <a:lnRef idx="2">
@@ -4199,6 +4269,11 @@
               <a:lumOff val="60000"/>
             </a:schemeClr>
           </a:solidFill>
+          <a:ln>
+            <a:solidFill>
+              <a:schemeClr val="tx1"/>
+            </a:solidFill>
+          </a:ln>
         </p:spPr>
         <p:style>
           <a:lnRef idx="2">
@@ -4260,6 +4335,11 @@
               <a:lumOff val="60000"/>
             </a:schemeClr>
           </a:solidFill>
+          <a:ln>
+            <a:solidFill>
+              <a:schemeClr val="tx1"/>
+            </a:solidFill>
+          </a:ln>
         </p:spPr>
         <p:style>
           <a:lnRef idx="2">
@@ -4321,6 +4401,11 @@
               <a:lumOff val="60000"/>
             </a:schemeClr>
           </a:solidFill>
+          <a:ln>
+            <a:solidFill>
+              <a:schemeClr val="tx1"/>
+            </a:solidFill>
+          </a:ln>
         </p:spPr>
         <p:style>
           <a:lnRef idx="2">
@@ -4382,6 +4467,11 @@
               <a:lumOff val="60000"/>
             </a:schemeClr>
           </a:solidFill>
+          <a:ln>
+            <a:solidFill>
+              <a:schemeClr val="tx1"/>
+            </a:solidFill>
+          </a:ln>
         </p:spPr>
         <p:style>
           <a:lnRef idx="2">
@@ -4443,6 +4533,11 @@
               <a:lumOff val="60000"/>
             </a:schemeClr>
           </a:solidFill>
+          <a:ln>
+            <a:solidFill>
+              <a:schemeClr val="tx1"/>
+            </a:solidFill>
+          </a:ln>
         </p:spPr>
         <p:style>
           <a:lnRef idx="2">
@@ -4504,6 +4599,11 @@
               <a:lumOff val="60000"/>
             </a:schemeClr>
           </a:solidFill>
+          <a:ln>
+            <a:solidFill>
+              <a:schemeClr val="tx1"/>
+            </a:solidFill>
+          </a:ln>
         </p:spPr>
         <p:style>
           <a:lnRef idx="2">
@@ -4565,6 +4665,11 @@
               <a:lumOff val="60000"/>
             </a:schemeClr>
           </a:solidFill>
+          <a:ln>
+            <a:solidFill>
+              <a:schemeClr val="tx1"/>
+            </a:solidFill>
+          </a:ln>
         </p:spPr>
         <p:style>
           <a:lnRef idx="2">
@@ -4626,6 +4731,11 @@
               <a:lumOff val="60000"/>
             </a:schemeClr>
           </a:solidFill>
+          <a:ln>
+            <a:solidFill>
+              <a:schemeClr val="tx1"/>
+            </a:solidFill>
+          </a:ln>
         </p:spPr>
         <p:style>
           <a:lnRef idx="2">
@@ -4687,6 +4797,11 @@
               <a:lumOff val="60000"/>
             </a:schemeClr>
           </a:solidFill>
+          <a:ln>
+            <a:solidFill>
+              <a:schemeClr val="tx1"/>
+            </a:solidFill>
+          </a:ln>
         </p:spPr>
         <p:style>
           <a:lnRef idx="2">
@@ -4748,6 +4863,11 @@
               <a:lumOff val="60000"/>
             </a:schemeClr>
           </a:solidFill>
+          <a:ln>
+            <a:solidFill>
+              <a:schemeClr val="tx1"/>
+            </a:solidFill>
+          </a:ln>
         </p:spPr>
         <p:style>
           <a:lnRef idx="2">
@@ -4809,6 +4929,11 @@
               <a:lumOff val="60000"/>
             </a:schemeClr>
           </a:solidFill>
+          <a:ln>
+            <a:solidFill>
+              <a:schemeClr val="tx1"/>
+            </a:solidFill>
+          </a:ln>
         </p:spPr>
         <p:style>
           <a:lnRef idx="2">
@@ -4870,6 +4995,11 @@
               <a:lumOff val="60000"/>
             </a:schemeClr>
           </a:solidFill>
+          <a:ln>
+            <a:solidFill>
+              <a:schemeClr val="tx1"/>
+            </a:solidFill>
+          </a:ln>
         </p:spPr>
         <p:style>
           <a:lnRef idx="2">
@@ -4931,6 +5061,11 @@
               <a:lumOff val="60000"/>
             </a:schemeClr>
           </a:solidFill>
+          <a:ln>
+            <a:solidFill>
+              <a:schemeClr val="tx1"/>
+            </a:solidFill>
+          </a:ln>
         </p:spPr>
         <p:style>
           <a:lnRef idx="2">
@@ -4992,6 +5127,11 @@
               <a:lumOff val="60000"/>
             </a:schemeClr>
           </a:solidFill>
+          <a:ln>
+            <a:solidFill>
+              <a:schemeClr val="tx1"/>
+            </a:solidFill>
+          </a:ln>
         </p:spPr>
         <p:style>
           <a:lnRef idx="2">
@@ -5053,6 +5193,11 @@
               <a:lumOff val="60000"/>
             </a:schemeClr>
           </a:solidFill>
+          <a:ln>
+            <a:solidFill>
+              <a:schemeClr val="tx1"/>
+            </a:solidFill>
+          </a:ln>
         </p:spPr>
         <p:style>
           <a:lnRef idx="2">
@@ -5114,6 +5259,11 @@
               <a:lumOff val="60000"/>
             </a:schemeClr>
           </a:solidFill>
+          <a:ln>
+            <a:solidFill>
+              <a:schemeClr val="tx1"/>
+            </a:solidFill>
+          </a:ln>
         </p:spPr>
         <p:style>
           <a:lnRef idx="2">
@@ -5175,6 +5325,11 @@
               <a:lumOff val="60000"/>
             </a:schemeClr>
           </a:solidFill>
+          <a:ln>
+            <a:solidFill>
+              <a:schemeClr val="tx1"/>
+            </a:solidFill>
+          </a:ln>
         </p:spPr>
         <p:style>
           <a:lnRef idx="2">
@@ -5236,6 +5391,11 @@
               <a:lumOff val="60000"/>
             </a:schemeClr>
           </a:solidFill>
+          <a:ln>
+            <a:solidFill>
+              <a:schemeClr val="tx1"/>
+            </a:solidFill>
+          </a:ln>
         </p:spPr>
         <p:style>
           <a:lnRef idx="2">
@@ -5297,6 +5457,11 @@
               <a:lumOff val="60000"/>
             </a:schemeClr>
           </a:solidFill>
+          <a:ln>
+            <a:solidFill>
+              <a:schemeClr val="tx1"/>
+            </a:solidFill>
+          </a:ln>
         </p:spPr>
         <p:style>
           <a:lnRef idx="2">
@@ -5358,6 +5523,11 @@
               <a:lumOff val="60000"/>
             </a:schemeClr>
           </a:solidFill>
+          <a:ln>
+            <a:solidFill>
+              <a:schemeClr val="tx1"/>
+            </a:solidFill>
+          </a:ln>
         </p:spPr>
         <p:style>
           <a:lnRef idx="2">
@@ -5419,6 +5589,11 @@
               <a:lumOff val="60000"/>
             </a:schemeClr>
           </a:solidFill>
+          <a:ln>
+            <a:solidFill>
+              <a:schemeClr val="tx1"/>
+            </a:solidFill>
+          </a:ln>
         </p:spPr>
         <p:style>
           <a:lnRef idx="2">
@@ -5480,6 +5655,11 @@
               <a:lumOff val="60000"/>
             </a:schemeClr>
           </a:solidFill>
+          <a:ln>
+            <a:solidFill>
+              <a:schemeClr val="tx1"/>
+            </a:solidFill>
+          </a:ln>
         </p:spPr>
         <p:style>
           <a:lnRef idx="2">
@@ -5541,6 +5721,11 @@
               <a:lumOff val="60000"/>
             </a:schemeClr>
           </a:solidFill>
+          <a:ln>
+            <a:solidFill>
+              <a:schemeClr val="tx1"/>
+            </a:solidFill>
+          </a:ln>
         </p:spPr>
         <p:style>
           <a:lnRef idx="2">
@@ -5602,6 +5787,11 @@
               <a:lumOff val="60000"/>
             </a:schemeClr>
           </a:solidFill>
+          <a:ln>
+            <a:solidFill>
+              <a:schemeClr val="tx1"/>
+            </a:solidFill>
+          </a:ln>
         </p:spPr>
         <p:style>
           <a:lnRef idx="2">
@@ -5663,6 +5853,11 @@
               <a:lumOff val="60000"/>
             </a:schemeClr>
           </a:solidFill>
+          <a:ln>
+            <a:solidFill>
+              <a:schemeClr val="tx1"/>
+            </a:solidFill>
+          </a:ln>
         </p:spPr>
         <p:style>
           <a:lnRef idx="2">
@@ -5724,6 +5919,11 @@
               <a:lumOff val="60000"/>
             </a:schemeClr>
           </a:solidFill>
+          <a:ln>
+            <a:solidFill>
+              <a:schemeClr val="tx1"/>
+            </a:solidFill>
+          </a:ln>
         </p:spPr>
         <p:style>
           <a:lnRef idx="2">
@@ -5785,6 +5985,11 @@
               <a:lumOff val="60000"/>
             </a:schemeClr>
           </a:solidFill>
+          <a:ln>
+            <a:solidFill>
+              <a:schemeClr val="tx1"/>
+            </a:solidFill>
+          </a:ln>
         </p:spPr>
         <p:style>
           <a:lnRef idx="2">
@@ -5846,6 +6051,11 @@
               <a:lumOff val="60000"/>
             </a:schemeClr>
           </a:solidFill>
+          <a:ln>
+            <a:solidFill>
+              <a:schemeClr val="tx1"/>
+            </a:solidFill>
+          </a:ln>
         </p:spPr>
         <p:style>
           <a:lnRef idx="2">
@@ -5907,6 +6117,11 @@
               <a:lumOff val="60000"/>
             </a:schemeClr>
           </a:solidFill>
+          <a:ln>
+            <a:solidFill>
+              <a:schemeClr val="tx1"/>
+            </a:solidFill>
+          </a:ln>
         </p:spPr>
         <p:style>
           <a:lnRef idx="2">
@@ -5968,6 +6183,11 @@
               <a:lumOff val="60000"/>
             </a:schemeClr>
           </a:solidFill>
+          <a:ln>
+            <a:solidFill>
+              <a:schemeClr val="tx1"/>
+            </a:solidFill>
+          </a:ln>
         </p:spPr>
         <p:style>
           <a:lnRef idx="2">
@@ -6029,6 +6249,11 @@
               <a:lumOff val="60000"/>
             </a:schemeClr>
           </a:solidFill>
+          <a:ln>
+            <a:solidFill>
+              <a:schemeClr val="tx1"/>
+            </a:solidFill>
+          </a:ln>
         </p:spPr>
         <p:style>
           <a:lnRef idx="2">

</xml_diff>